<commit_message>
[add] 2019-01-03 Study coq, functional language
</commit_message>
<xml_diff>
--- a/Study/13. SHA256.pptx
+++ b/Study/13. SHA256.pptx
@@ -206,7 +206,7 @@
           <a:p>
             <a:fld id="{8DD9E706-E0BA-4FBD-AF15-9E3682821587}" type="datetimeFigureOut">
               <a:rPr lang="ko-KR" altLang="en-US" smtClean="0"/>
-              <a:t>2019-01-02</a:t>
+              <a:t>2019-01-03</a:t>
             </a:fld>
             <a:endParaRPr lang="ko-KR" altLang="en-US"/>
           </a:p>
@@ -1738,6 +1738,36 @@
               <a:buNone/>
             </a:pPr>
             <a:r>
+              <a:rPr lang="ko-KR" altLang="en-US" dirty="0">
+                <a:effectLst/>
+              </a:rPr>
+              <a:t>압축함수</a:t>
+            </a:r>
+            <a:r>
+              <a:rPr lang="en-US" altLang="ko-KR" dirty="0">
+                <a:effectLst/>
+              </a:rPr>
+              <a:t>(Compression </a:t>
+            </a:r>
+            <a:r>
+              <a:rPr lang="en-US" altLang="ko-KR" dirty="0" err="1">
+                <a:effectLst/>
+              </a:rPr>
+              <a:t>func</a:t>
+            </a:r>
+            <a:r>
+              <a:rPr lang="en-US" altLang="ko-KR" dirty="0">
+                <a:effectLst/>
+              </a:rPr>
+              <a:t>)</a:t>
+            </a:r>
+            <a:r>
+              <a:rPr lang="ko-KR" altLang="en-US" dirty="0">
+                <a:effectLst/>
+              </a:rPr>
+              <a:t>에서 수차례 </a:t>
+            </a:r>
+            <a:r>
               <a:rPr lang="en-US" altLang="ko-KR" dirty="0">
                 <a:effectLst/>
               </a:rPr>
@@ -1747,11 +1777,80 @@
               <a:rPr lang="en-US" altLang="ko-KR" dirty="0" err="1">
                 <a:effectLst/>
               </a:rPr>
-              <a:t>and,or,xor,shr,rotr</a:t>
-            </a:r>
-            <a:br>
-              <a:rPr lang="en-US" altLang="ko-KR" dirty="0"/>
-            </a:br>
+              <a:t>and,or</a:t>
+            </a:r>
+            <a:r>
+              <a:rPr lang="en-US" altLang="ko-KR" dirty="0">
+                <a:effectLst/>
+              </a:rPr>
+              <a:t>,</a:t>
+            </a:r>
+            <a:r>
+              <a:rPr lang="ko-KR" altLang="en-US" dirty="0" err="1">
+                <a:effectLst/>
+              </a:rPr>
+              <a:t>택</a:t>
+            </a:r>
+            <a:r>
+              <a:rPr lang="en-US" altLang="ko-KR" dirty="0">
+                <a:effectLst/>
+              </a:rPr>
+              <a:t>,</a:t>
+            </a:r>
+            <a:r>
+              <a:rPr lang="en-US" altLang="ko-KR" dirty="0" err="1">
+                <a:effectLst/>
+              </a:rPr>
+              <a:t>shr,rotr</a:t>
+            </a:r>
+            <a:r>
+              <a:rPr lang="en-US" altLang="ko-KR" dirty="0">
+                <a:effectLst/>
+              </a:rPr>
+              <a:t> </a:t>
+            </a:r>
+            <a:r>
+              <a:rPr lang="ko-KR" altLang="en-US" dirty="0">
+                <a:effectLst/>
+              </a:rPr>
+              <a:t>연산이 이뤄지면서 눈사태</a:t>
+            </a:r>
+            <a:r>
+              <a:rPr lang="en-US" altLang="ko-KR" dirty="0">
+                <a:effectLst/>
+              </a:rPr>
+              <a:t>(</a:t>
+            </a:r>
+            <a:r>
+              <a:rPr lang="ko-KR" altLang="en-US" dirty="0">
+                <a:effectLst/>
+              </a:rPr>
+              <a:t>쇄도</a:t>
+            </a:r>
+            <a:r>
+              <a:rPr lang="en-US" altLang="ko-KR" dirty="0">
+                <a:effectLst/>
+              </a:rPr>
+              <a:t>)</a:t>
+            </a:r>
+            <a:r>
+              <a:rPr lang="ko-KR" altLang="en-US" dirty="0">
+                <a:effectLst/>
+              </a:rPr>
+              <a:t>효과를 </a:t>
+            </a:r>
+            <a:r>
+              <a:rPr lang="ko-KR" altLang="en-US" dirty="0" err="1">
+                <a:effectLst/>
+              </a:rPr>
+              <a:t>만들어냄</a:t>
+            </a:r>
+            <a:r>
+              <a:rPr lang="en-US" altLang="ko-KR" dirty="0">
+                <a:effectLst/>
+              </a:rPr>
+              <a:t>.</a:t>
+            </a:r>
             <a:endParaRPr lang="en-US" altLang="ko-KR" sz="1200" b="0" i="0" kern="1200" dirty="0">
               <a:solidFill>
                 <a:schemeClr val="tx1"/>
@@ -1931,7 +2030,7 @@
           <a:p>
             <a:fld id="{46A2558D-9475-4DD4-8F32-96381613298F}" type="datetimeFigureOut">
               <a:rPr lang="ko-KR" altLang="en-US" smtClean="0"/>
-              <a:t>2019-01-02</a:t>
+              <a:t>2019-01-03</a:t>
             </a:fld>
             <a:endParaRPr lang="ko-KR" altLang="en-US"/>
           </a:p>
@@ -2101,7 +2200,7 @@
           <a:p>
             <a:fld id="{46A2558D-9475-4DD4-8F32-96381613298F}" type="datetimeFigureOut">
               <a:rPr lang="ko-KR" altLang="en-US" smtClean="0"/>
-              <a:t>2019-01-02</a:t>
+              <a:t>2019-01-03</a:t>
             </a:fld>
             <a:endParaRPr lang="ko-KR" altLang="en-US"/>
           </a:p>
@@ -2281,7 +2380,7 @@
           <a:p>
             <a:fld id="{46A2558D-9475-4DD4-8F32-96381613298F}" type="datetimeFigureOut">
               <a:rPr lang="ko-KR" altLang="en-US" smtClean="0"/>
-              <a:t>2019-01-02</a:t>
+              <a:t>2019-01-03</a:t>
             </a:fld>
             <a:endParaRPr lang="ko-KR" altLang="en-US"/>
           </a:p>
@@ -2451,7 +2550,7 @@
           <a:p>
             <a:fld id="{46A2558D-9475-4DD4-8F32-96381613298F}" type="datetimeFigureOut">
               <a:rPr lang="ko-KR" altLang="en-US" smtClean="0"/>
-              <a:t>2019-01-02</a:t>
+              <a:t>2019-01-03</a:t>
             </a:fld>
             <a:endParaRPr lang="ko-KR" altLang="en-US"/>
           </a:p>
@@ -2697,7 +2796,7 @@
           <a:p>
             <a:fld id="{46A2558D-9475-4DD4-8F32-96381613298F}" type="datetimeFigureOut">
               <a:rPr lang="ko-KR" altLang="en-US" smtClean="0"/>
-              <a:t>2019-01-02</a:t>
+              <a:t>2019-01-03</a:t>
             </a:fld>
             <a:endParaRPr lang="ko-KR" altLang="en-US"/>
           </a:p>
@@ -2929,7 +3028,7 @@
           <a:p>
             <a:fld id="{46A2558D-9475-4DD4-8F32-96381613298F}" type="datetimeFigureOut">
               <a:rPr lang="ko-KR" altLang="en-US" smtClean="0"/>
-              <a:t>2019-01-02</a:t>
+              <a:t>2019-01-03</a:t>
             </a:fld>
             <a:endParaRPr lang="ko-KR" altLang="en-US"/>
           </a:p>
@@ -3296,7 +3395,7 @@
           <a:p>
             <a:fld id="{46A2558D-9475-4DD4-8F32-96381613298F}" type="datetimeFigureOut">
               <a:rPr lang="ko-KR" altLang="en-US" smtClean="0"/>
-              <a:t>2019-01-02</a:t>
+              <a:t>2019-01-03</a:t>
             </a:fld>
             <a:endParaRPr lang="ko-KR" altLang="en-US"/>
           </a:p>
@@ -3414,7 +3513,7 @@
           <a:p>
             <a:fld id="{46A2558D-9475-4DD4-8F32-96381613298F}" type="datetimeFigureOut">
               <a:rPr lang="ko-KR" altLang="en-US" smtClean="0"/>
-              <a:t>2019-01-02</a:t>
+              <a:t>2019-01-03</a:t>
             </a:fld>
             <a:endParaRPr lang="ko-KR" altLang="en-US"/>
           </a:p>
@@ -3509,7 +3608,7 @@
           <a:p>
             <a:fld id="{46A2558D-9475-4DD4-8F32-96381613298F}" type="datetimeFigureOut">
               <a:rPr lang="ko-KR" altLang="en-US" smtClean="0"/>
-              <a:t>2019-01-02</a:t>
+              <a:t>2019-01-03</a:t>
             </a:fld>
             <a:endParaRPr lang="ko-KR" altLang="en-US"/>
           </a:p>
@@ -3786,7 +3885,7 @@
           <a:p>
             <a:fld id="{46A2558D-9475-4DD4-8F32-96381613298F}" type="datetimeFigureOut">
               <a:rPr lang="ko-KR" altLang="en-US" smtClean="0"/>
-              <a:t>2019-01-02</a:t>
+              <a:t>2019-01-03</a:t>
             </a:fld>
             <a:endParaRPr lang="ko-KR" altLang="en-US"/>
           </a:p>
@@ -4043,7 +4142,7 @@
           <a:p>
             <a:fld id="{46A2558D-9475-4DD4-8F32-96381613298F}" type="datetimeFigureOut">
               <a:rPr lang="ko-KR" altLang="en-US" smtClean="0"/>
-              <a:t>2019-01-02</a:t>
+              <a:t>2019-01-03</a:t>
             </a:fld>
             <a:endParaRPr lang="ko-KR" altLang="en-US"/>
           </a:p>
@@ -4256,7 +4355,7 @@
           <a:p>
             <a:fld id="{46A2558D-9475-4DD4-8F32-96381613298F}" type="datetimeFigureOut">
               <a:rPr lang="ko-KR" altLang="en-US" smtClean="0"/>
-              <a:t>2019-01-02</a:t>
+              <a:t>2019-01-03</a:t>
             </a:fld>
             <a:endParaRPr lang="ko-KR" altLang="en-US"/>
           </a:p>
@@ -6704,33 +6803,15 @@
                                   </p:childTnLst>
                                 </p:cTn>
                               </p:par>
-                            </p:childTnLst>
-                          </p:cTn>
-                        </p:par>
-                      </p:childTnLst>
-                    </p:cTn>
-                  </p:par>
-                  <p:par>
-                    <p:cTn id="8" fill="hold">
-                      <p:stCondLst>
-                        <p:cond delay="indefinite"/>
-                      </p:stCondLst>
-                      <p:childTnLst>
-                        <p:par>
-                          <p:cTn id="9" fill="hold">
-                            <p:stCondLst>
-                              <p:cond delay="0"/>
-                            </p:stCondLst>
-                            <p:childTnLst>
                               <p:par>
-                                <p:cTn id="10" presetID="10" presetClass="entr" presetSubtype="0" fill="hold" nodeType="clickEffect">
+                                <p:cTn id="8" presetID="10" presetClass="entr" presetSubtype="0" fill="hold" nodeType="withEffect">
                                   <p:stCondLst>
                                     <p:cond delay="0"/>
                                   </p:stCondLst>
                                   <p:childTnLst>
                                     <p:set>
                                       <p:cBhvr>
-                                        <p:cTn id="11" dur="1" fill="hold">
+                                        <p:cTn id="9" dur="1" fill="hold">
                                           <p:stCondLst>
                                             <p:cond delay="0"/>
                                           </p:stCondLst>
@@ -6748,9 +6829,62 @@
                                     </p:set>
                                     <p:animEffect transition="in" filter="fade">
                                       <p:cBhvr>
-                                        <p:cTn id="12" dur="500"/>
+                                        <p:cTn id="10" dur="500"/>
                                         <p:tgtEl>
                                           <p:spTgt spid="5"/>
+                                        </p:tgtEl>
+                                      </p:cBhvr>
+                                    </p:animEffect>
+                                  </p:childTnLst>
+                                </p:cTn>
+                              </p:par>
+                            </p:childTnLst>
+                          </p:cTn>
+                        </p:par>
+                      </p:childTnLst>
+                    </p:cTn>
+                  </p:par>
+                  <p:par>
+                    <p:cTn id="11" fill="hold">
+                      <p:stCondLst>
+                        <p:cond delay="indefinite"/>
+                      </p:stCondLst>
+                      <p:childTnLst>
+                        <p:par>
+                          <p:cTn id="12" fill="hold">
+                            <p:stCondLst>
+                              <p:cond delay="0"/>
+                            </p:stCondLst>
+                            <p:childTnLst>
+                              <p:par>
+                                <p:cTn id="13" presetID="10" presetClass="entr" presetSubtype="0" fill="hold" grpId="0" nodeType="clickEffect">
+                                  <p:stCondLst>
+                                    <p:cond delay="0"/>
+                                  </p:stCondLst>
+                                  <p:childTnLst>
+                                    <p:set>
+                                      <p:cBhvr>
+                                        <p:cTn id="14" dur="1" fill="hold">
+                                          <p:stCondLst>
+                                            <p:cond delay="0"/>
+                                          </p:stCondLst>
+                                        </p:cTn>
+                                        <p:tgtEl>
+                                          <p:spTgt spid="21"/>
+                                        </p:tgtEl>
+                                        <p:attrNameLst>
+                                          <p:attrName>style.visibility</p:attrName>
+                                        </p:attrNameLst>
+                                      </p:cBhvr>
+                                      <p:to>
+                                        <p:strVal val="visible"/>
+                                      </p:to>
+                                    </p:set>
+                                    <p:animEffect transition="in" filter="fade">
+                                      <p:cBhvr>
+                                        <p:cTn id="15" dur="500"/>
+                                        <p:tgtEl>
+                                          <p:spTgt spid="21"/>
                                         </p:tgtEl>
                                       </p:cBhvr>
                                     </p:animEffect>
@@ -6784,6 +6918,9 @@
         </p:cTn>
       </p:par>
     </p:tnLst>
+    <p:bldLst>
+      <p:bldP spid="21" grpId="0"/>
+    </p:bldLst>
   </p:timing>
 </p:sld>
 </file>
@@ -8743,7 +8880,7 @@
                 </a:solidFill>
                 <a:latin typeface="Source Serif Pro"/>
               </a:rPr>
-              <a:t>이 영역이 </a:t>
+              <a:t>해당 영역이 </a:t>
             </a:r>
             <a:r>
               <a:rPr lang="en-US" altLang="ko-KR" dirty="0">
@@ -8761,7 +8898,7 @@
                 </a:solidFill>
                 <a:latin typeface="Source Serif Pro"/>
               </a:rPr>
-              <a:t>개의 블록이다</a:t>
+              <a:t>개의 블록</a:t>
             </a:r>
             <a:r>
               <a:rPr lang="en-US" altLang="ko-KR" dirty="0">

</xml_diff>

<commit_message>
[add] 2019-01-07 Study / coq, functional programming
</commit_message>
<xml_diff>
--- a/Study/13. SHA256.pptx
+++ b/Study/13. SHA256.pptx
@@ -206,7 +206,7 @@
           <a:p>
             <a:fld id="{8DD9E706-E0BA-4FBD-AF15-9E3682821587}" type="datetimeFigureOut">
               <a:rPr lang="ko-KR" altLang="en-US" smtClean="0"/>
-              <a:t>2019-01-03</a:t>
+              <a:t>2019-01-04</a:t>
             </a:fld>
             <a:endParaRPr lang="ko-KR" altLang="en-US"/>
           </a:p>
@@ -794,6 +794,114 @@
             <a:pPr marL="0" indent="0">
               <a:buNone/>
             </a:pPr>
+            <a:r>
+              <a:rPr lang="ko-KR" altLang="en-US" sz="1200" b="0" i="0" kern="1200" dirty="0">
+                <a:solidFill>
+                  <a:schemeClr val="tx1"/>
+                </a:solidFill>
+                <a:effectLst/>
+                <a:latin typeface="+mn-lt"/>
+                <a:ea typeface="+mn-ea"/>
+                <a:cs typeface="+mn-cs"/>
+              </a:rPr>
+              <a:t>만약 </a:t>
+            </a:r>
+            <a:r>
+              <a:rPr lang="ko-KR" altLang="en-US" sz="1200" b="0" i="0" kern="1200" dirty="0" err="1">
+                <a:solidFill>
+                  <a:schemeClr val="tx1"/>
+                </a:solidFill>
+                <a:effectLst/>
+                <a:latin typeface="+mn-lt"/>
+                <a:ea typeface="+mn-ea"/>
+                <a:cs typeface="+mn-cs"/>
+              </a:rPr>
+              <a:t>해시값</a:t>
+            </a:r>
+            <a:r>
+              <a:rPr lang="en-US" altLang="ko-KR" sz="1200" b="0" i="0" kern="1200" dirty="0">
+                <a:solidFill>
+                  <a:schemeClr val="tx1"/>
+                </a:solidFill>
+                <a:effectLst/>
+                <a:latin typeface="+mn-lt"/>
+                <a:ea typeface="+mn-ea"/>
+                <a:cs typeface="+mn-cs"/>
+              </a:rPr>
+              <a:t>(</a:t>
+            </a:r>
+            <a:r>
+              <a:rPr lang="ko-KR" altLang="en-US" sz="1200" b="0" i="0" kern="1200" dirty="0">
+                <a:solidFill>
+                  <a:schemeClr val="tx1"/>
+                </a:solidFill>
+                <a:effectLst/>
+                <a:latin typeface="+mn-lt"/>
+                <a:ea typeface="+mn-ea"/>
+                <a:cs typeface="+mn-cs"/>
+              </a:rPr>
+              <a:t>다이제스트</a:t>
+            </a:r>
+            <a:r>
+              <a:rPr lang="en-US" altLang="ko-KR" sz="1200" b="0" i="0" kern="1200" dirty="0">
+                <a:solidFill>
+                  <a:schemeClr val="tx1"/>
+                </a:solidFill>
+                <a:effectLst/>
+                <a:latin typeface="+mn-lt"/>
+                <a:ea typeface="+mn-ea"/>
+                <a:cs typeface="+mn-cs"/>
+              </a:rPr>
+              <a:t>)</a:t>
+            </a:r>
+            <a:r>
+              <a:rPr lang="ko-KR" altLang="en-US" sz="1200" b="0" i="0" kern="1200" dirty="0">
+                <a:solidFill>
+                  <a:schemeClr val="tx1"/>
+                </a:solidFill>
+                <a:effectLst/>
+                <a:latin typeface="+mn-lt"/>
+                <a:ea typeface="+mn-ea"/>
+                <a:cs typeface="+mn-cs"/>
+              </a:rPr>
+              <a:t>의 원래 값을 </a:t>
+            </a:r>
+            <a:r>
+              <a:rPr lang="ko-KR" altLang="en-US" sz="1200" b="0" i="0" kern="1200" dirty="0" err="1">
+                <a:solidFill>
+                  <a:schemeClr val="tx1"/>
+                </a:solidFill>
+                <a:effectLst/>
+                <a:latin typeface="+mn-lt"/>
+                <a:ea typeface="+mn-ea"/>
+                <a:cs typeface="+mn-cs"/>
+              </a:rPr>
+              <a:t>알고싶으면</a:t>
+            </a:r>
+            <a:r>
+              <a:rPr lang="ko-KR" altLang="en-US" sz="1200" b="0" i="0" kern="1200" dirty="0">
+                <a:solidFill>
+                  <a:schemeClr val="tx1"/>
+                </a:solidFill>
+                <a:effectLst/>
+                <a:latin typeface="+mn-lt"/>
+                <a:ea typeface="+mn-ea"/>
+                <a:cs typeface="+mn-cs"/>
+              </a:rPr>
+              <a:t> </a:t>
+            </a:r>
+            <a:r>
+              <a:rPr lang="ko-KR" altLang="en-US" sz="1200" b="0" i="0" kern="1200" dirty="0" err="1">
+                <a:solidFill>
+                  <a:schemeClr val="tx1"/>
+                </a:solidFill>
+                <a:effectLst/>
+                <a:latin typeface="+mn-lt"/>
+                <a:ea typeface="+mn-ea"/>
+                <a:cs typeface="+mn-cs"/>
+              </a:rPr>
+              <a:t>브루트포스뿐임</a:t>
+            </a:r>
             <a:endParaRPr lang="en-US" altLang="ko-KR" sz="1200" b="0" i="0" kern="1200" dirty="0">
               <a:solidFill>
                 <a:schemeClr val="tx1"/>
@@ -1556,6 +1664,34 @@
               </a:rPr>
               <a:t>.</a:t>
             </a:r>
+          </a:p>
+          <a:p>
+            <a:pPr marL="0" indent="0">
+              <a:buNone/>
+            </a:pPr>
+            <a:endParaRPr lang="en-US" altLang="ko-KR" sz="1200" b="0" i="0" kern="1200" dirty="0">
+              <a:solidFill>
+                <a:schemeClr val="tx1"/>
+              </a:solidFill>
+              <a:effectLst/>
+              <a:latin typeface="+mn-lt"/>
+              <a:ea typeface="+mn-ea"/>
+              <a:cs typeface="+mn-cs"/>
+            </a:endParaRPr>
+          </a:p>
+          <a:p>
+            <a:pPr marL="0" indent="0">
+              <a:buNone/>
+            </a:pPr>
+            <a:endParaRPr lang="en-US" altLang="ko-KR" sz="1200" b="0" i="0" kern="1200" dirty="0">
+              <a:solidFill>
+                <a:schemeClr val="tx1"/>
+              </a:solidFill>
+              <a:effectLst/>
+              <a:latin typeface="+mn-lt"/>
+              <a:ea typeface="+mn-ea"/>
+              <a:cs typeface="+mn-cs"/>
+            </a:endParaRPr>
           </a:p>
         </p:txBody>
       </p:sp>
@@ -2030,7 +2166,7 @@
           <a:p>
             <a:fld id="{46A2558D-9475-4DD4-8F32-96381613298F}" type="datetimeFigureOut">
               <a:rPr lang="ko-KR" altLang="en-US" smtClean="0"/>
-              <a:t>2019-01-03</a:t>
+              <a:t>2019-01-04</a:t>
             </a:fld>
             <a:endParaRPr lang="ko-KR" altLang="en-US"/>
           </a:p>
@@ -2200,7 +2336,7 @@
           <a:p>
             <a:fld id="{46A2558D-9475-4DD4-8F32-96381613298F}" type="datetimeFigureOut">
               <a:rPr lang="ko-KR" altLang="en-US" smtClean="0"/>
-              <a:t>2019-01-03</a:t>
+              <a:t>2019-01-04</a:t>
             </a:fld>
             <a:endParaRPr lang="ko-KR" altLang="en-US"/>
           </a:p>
@@ -2380,7 +2516,7 @@
           <a:p>
             <a:fld id="{46A2558D-9475-4DD4-8F32-96381613298F}" type="datetimeFigureOut">
               <a:rPr lang="ko-KR" altLang="en-US" smtClean="0"/>
-              <a:t>2019-01-03</a:t>
+              <a:t>2019-01-04</a:t>
             </a:fld>
             <a:endParaRPr lang="ko-KR" altLang="en-US"/>
           </a:p>
@@ -2550,7 +2686,7 @@
           <a:p>
             <a:fld id="{46A2558D-9475-4DD4-8F32-96381613298F}" type="datetimeFigureOut">
               <a:rPr lang="ko-KR" altLang="en-US" smtClean="0"/>
-              <a:t>2019-01-03</a:t>
+              <a:t>2019-01-04</a:t>
             </a:fld>
             <a:endParaRPr lang="ko-KR" altLang="en-US"/>
           </a:p>
@@ -2796,7 +2932,7 @@
           <a:p>
             <a:fld id="{46A2558D-9475-4DD4-8F32-96381613298F}" type="datetimeFigureOut">
               <a:rPr lang="ko-KR" altLang="en-US" smtClean="0"/>
-              <a:t>2019-01-03</a:t>
+              <a:t>2019-01-04</a:t>
             </a:fld>
             <a:endParaRPr lang="ko-KR" altLang="en-US"/>
           </a:p>
@@ -3028,7 +3164,7 @@
           <a:p>
             <a:fld id="{46A2558D-9475-4DD4-8F32-96381613298F}" type="datetimeFigureOut">
               <a:rPr lang="ko-KR" altLang="en-US" smtClean="0"/>
-              <a:t>2019-01-03</a:t>
+              <a:t>2019-01-04</a:t>
             </a:fld>
             <a:endParaRPr lang="ko-KR" altLang="en-US"/>
           </a:p>
@@ -3395,7 +3531,7 @@
           <a:p>
             <a:fld id="{46A2558D-9475-4DD4-8F32-96381613298F}" type="datetimeFigureOut">
               <a:rPr lang="ko-KR" altLang="en-US" smtClean="0"/>
-              <a:t>2019-01-03</a:t>
+              <a:t>2019-01-04</a:t>
             </a:fld>
             <a:endParaRPr lang="ko-KR" altLang="en-US"/>
           </a:p>
@@ -3513,7 +3649,7 @@
           <a:p>
             <a:fld id="{46A2558D-9475-4DD4-8F32-96381613298F}" type="datetimeFigureOut">
               <a:rPr lang="ko-KR" altLang="en-US" smtClean="0"/>
-              <a:t>2019-01-03</a:t>
+              <a:t>2019-01-04</a:t>
             </a:fld>
             <a:endParaRPr lang="ko-KR" altLang="en-US"/>
           </a:p>
@@ -3608,7 +3744,7 @@
           <a:p>
             <a:fld id="{46A2558D-9475-4DD4-8F32-96381613298F}" type="datetimeFigureOut">
               <a:rPr lang="ko-KR" altLang="en-US" smtClean="0"/>
-              <a:t>2019-01-03</a:t>
+              <a:t>2019-01-04</a:t>
             </a:fld>
             <a:endParaRPr lang="ko-KR" altLang="en-US"/>
           </a:p>
@@ -3885,7 +4021,7 @@
           <a:p>
             <a:fld id="{46A2558D-9475-4DD4-8F32-96381613298F}" type="datetimeFigureOut">
               <a:rPr lang="ko-KR" altLang="en-US" smtClean="0"/>
-              <a:t>2019-01-03</a:t>
+              <a:t>2019-01-04</a:t>
             </a:fld>
             <a:endParaRPr lang="ko-KR" altLang="en-US"/>
           </a:p>
@@ -4142,7 +4278,7 @@
           <a:p>
             <a:fld id="{46A2558D-9475-4DD4-8F32-96381613298F}" type="datetimeFigureOut">
               <a:rPr lang="ko-KR" altLang="en-US" smtClean="0"/>
-              <a:t>2019-01-03</a:t>
+              <a:t>2019-01-04</a:t>
             </a:fld>
             <a:endParaRPr lang="ko-KR" altLang="en-US"/>
           </a:p>
@@ -4355,7 +4491,7 @@
           <a:p>
             <a:fld id="{46A2558D-9475-4DD4-8F32-96381613298F}" type="datetimeFigureOut">
               <a:rPr lang="ko-KR" altLang="en-US" smtClean="0"/>
-              <a:t>2019-01-03</a:t>
+              <a:t>2019-01-04</a:t>
             </a:fld>
             <a:endParaRPr lang="ko-KR" altLang="en-US"/>
           </a:p>
@@ -5242,7 +5378,7 @@
         </p:nvSpPr>
         <p:spPr>
           <a:xfrm>
-            <a:off x="4467627" y="3243701"/>
+            <a:off x="4343340" y="3293063"/>
             <a:ext cx="3505319" cy="523220"/>
           </a:xfrm>
           <a:prstGeom prst="rect">

</xml_diff>